<commit_message>
Dear God I hope this is the final commit
</commit_message>
<xml_diff>
--- a/week_08/case_study_08.pptx
+++ b/week_08/case_study_08.pptx
@@ -7,6 +7,8 @@
   <p:sldIdLst>
     <p:sldId id="256" r:id="rId2"/>
     <p:sldId id="257" r:id="rId3"/>
+    <p:sldId id="258" r:id="rId4"/>
+    <p:sldId id="259" r:id="rId5"/>
   </p:sldIdLst>
   <p:sldSz cx="9144000" cy="6858000" type="screen4x3"/>
   <p:notesSz cx="6858000" cy="9144000"/>
@@ -3276,12 +3278,828 @@
           <a:bodyPr/>
           <a:lstStyle/>
           <a:p>
+            <a:pPr lvl="0" indent="0">
+              <a:buNone/>
+            </a:pPr>
+            <a:r>
+              <a:rPr i="1">
+                <a:solidFill>
+                  <a:srgbClr val="60A0B0"/>
+                </a:solidFill>
+                <a:latin typeface="Courier"/>
+              </a:rPr>
+              <a:t>#Load Packages</a:t>
+            </a:r>
+            <a:br/>
+            <a:r>
+              <a:rPr>
+                <a:solidFill>
+                  <a:srgbClr val="06287E"/>
+                </a:solidFill>
+                <a:latin typeface="Courier"/>
+              </a:rPr>
+              <a:t>library</a:t>
+            </a:r>
+            <a:r>
+              <a:rPr>
+                <a:latin typeface="Courier"/>
+              </a:rPr>
+              <a:t>(tidyverse)</a:t>
+            </a:r>
+            <a:br/>
+            <a:r>
+              <a:rPr>
+                <a:solidFill>
+                  <a:srgbClr val="06287E"/>
+                </a:solidFill>
+                <a:latin typeface="Courier"/>
+              </a:rPr>
+              <a:t>library</a:t>
+            </a:r>
+            <a:r>
+              <a:rPr>
+                <a:latin typeface="Courier"/>
+              </a:rPr>
+              <a:t>(dplyr)</a:t>
+            </a:r>
+            <a:br/>
+            <a:r>
+              <a:rPr>
+                <a:solidFill>
+                  <a:srgbClr val="06287E"/>
+                </a:solidFill>
+                <a:latin typeface="Courier"/>
+              </a:rPr>
+              <a:t>library</a:t>
+            </a:r>
+            <a:r>
+              <a:rPr>
+                <a:latin typeface="Courier"/>
+              </a:rPr>
+              <a:t>(kableExtra)</a:t>
+            </a:r>
+            <a:br/>
+            <a:br/>
+            <a:r>
+              <a:rPr i="1">
+                <a:solidFill>
+                  <a:srgbClr val="60A0B0"/>
+                </a:solidFill>
+                <a:latin typeface="Courier"/>
+              </a:rPr>
+              <a:t>#Read data in</a:t>
+            </a:r>
+            <a:br/>
+            <a:r>
+              <a:rPr>
+                <a:latin typeface="Courier"/>
+              </a:rPr>
+              <a:t>URL</a:t>
+            </a:r>
+            <a:r>
+              <a:rPr>
+                <a:solidFill>
+                  <a:srgbClr val="007020"/>
+                </a:solidFill>
+                <a:latin typeface="Courier"/>
+              </a:rPr>
+              <a:t>&lt;-</a:t>
+            </a:r>
+            <a:r>
+              <a:rPr>
+                <a:latin typeface="Courier"/>
+              </a:rPr>
+              <a:t> (</a:t>
+            </a:r>
+            <a:r>
+              <a:rPr>
+                <a:solidFill>
+                  <a:srgbClr val="4070A0"/>
+                </a:solidFill>
+                <a:latin typeface="Courier"/>
+              </a:rPr>
+              <a:t>"https://gml.noaa.gov/webdata/ccgg/trends/co2/co2_annmean_mlo.txt"</a:t>
+            </a:r>
+            <a:r>
+              <a:rPr>
+                <a:latin typeface="Courier"/>
+              </a:rPr>
+              <a:t>)</a:t>
+            </a:r>
+            <a:br/>
+            <a:r>
+              <a:rPr>
+                <a:latin typeface="Courier"/>
+              </a:rPr>
+              <a:t>Data </a:t>
+            </a:r>
+            <a:r>
+              <a:rPr>
+                <a:solidFill>
+                  <a:srgbClr val="007020"/>
+                </a:solidFill>
+                <a:latin typeface="Courier"/>
+              </a:rPr>
+              <a:t>&lt;-</a:t>
+            </a:r>
+            <a:r>
+              <a:rPr>
+                <a:latin typeface="Courier"/>
+              </a:rPr>
+              <a:t> </a:t>
+            </a:r>
+            <a:r>
+              <a:rPr>
+                <a:solidFill>
+                  <a:srgbClr val="06287E"/>
+                </a:solidFill>
+                <a:latin typeface="Courier"/>
+              </a:rPr>
+              <a:t>read_table</a:t>
+            </a:r>
+            <a:r>
+              <a:rPr>
+                <a:latin typeface="Courier"/>
+              </a:rPr>
+              <a:t>(URL, </a:t>
+            </a:r>
+            <a:r>
+              <a:rPr>
+                <a:solidFill>
+                  <a:srgbClr val="7D9029"/>
+                </a:solidFill>
+                <a:latin typeface="Courier"/>
+              </a:rPr>
+              <a:t>skip=</a:t>
+            </a:r>
+            <a:r>
+              <a:rPr>
+                <a:solidFill>
+                  <a:srgbClr val="40A070"/>
+                </a:solidFill>
+                <a:latin typeface="Courier"/>
+              </a:rPr>
+              <a:t>57</a:t>
+            </a:r>
+            <a:r>
+              <a:rPr>
+                <a:latin typeface="Courier"/>
+              </a:rPr>
+              <a:t>, </a:t>
+            </a:r>
+            <a:r>
+              <a:rPr>
+                <a:solidFill>
+                  <a:srgbClr val="7D9029"/>
+                </a:solidFill>
+                <a:latin typeface="Courier"/>
+              </a:rPr>
+              <a:t>col_names=</a:t>
+            </a:r>
+            <a:r>
+              <a:rPr>
+                <a:latin typeface="Courier"/>
+              </a:rPr>
+              <a:t> </a:t>
+            </a:r>
+            <a:r>
+              <a:rPr>
+                <a:solidFill>
+                  <a:srgbClr val="06287E"/>
+                </a:solidFill>
+                <a:latin typeface="Courier"/>
+              </a:rPr>
+              <a:t>c</a:t>
+            </a:r>
+            <a:r>
+              <a:rPr>
+                <a:latin typeface="Courier"/>
+              </a:rPr>
+              <a:t>(</a:t>
+            </a:r>
+            <a:r>
+              <a:rPr>
+                <a:solidFill>
+                  <a:srgbClr val="4070A0"/>
+                </a:solidFill>
+                <a:latin typeface="Courier"/>
+              </a:rPr>
+              <a:t>"year"</a:t>
+            </a:r>
+            <a:r>
+              <a:rPr>
+                <a:latin typeface="Courier"/>
+              </a:rPr>
+              <a:t>, </a:t>
+            </a:r>
+            <a:r>
+              <a:rPr>
+                <a:solidFill>
+                  <a:srgbClr val="4070A0"/>
+                </a:solidFill>
+                <a:latin typeface="Courier"/>
+              </a:rPr>
+              <a:t>"mean"</a:t>
+            </a:r>
+            <a:r>
+              <a:rPr>
+                <a:latin typeface="Courier"/>
+              </a:rPr>
+              <a:t>, </a:t>
+            </a:r>
+            <a:r>
+              <a:rPr>
+                <a:solidFill>
+                  <a:srgbClr val="4070A0"/>
+                </a:solidFill>
+                <a:latin typeface="Courier"/>
+              </a:rPr>
+              <a:t>"unc"</a:t>
+            </a:r>
+            <a:r>
+              <a:rPr>
+                <a:latin typeface="Courier"/>
+              </a:rPr>
+              <a:t>))</a:t>
+            </a:r>
+          </a:p>
+          <a:p>
+            <a:pPr lvl="0" indent="0">
+              <a:buNone/>
+            </a:pPr>
+            <a:r>
+              <a:rPr>
+                <a:latin typeface="Courier"/>
+              </a:rPr>
+              <a:t>## 
+## -- Column specification ------------------------------------------------------------
+## cols(
+##   year = col_double(),
+##   mean = col_double(),
+##   unc = col_double()
+## )</a:t>
+            </a:r>
+          </a:p>
+          <a:p>
+            <a:pPr lvl="0" indent="0">
+              <a:buNone/>
+            </a:pPr>
+            <a:r>
+              <a:rPr i="1">
+                <a:solidFill>
+                  <a:srgbClr val="60A0B0"/>
+                </a:solidFill>
+                <a:latin typeface="Courier"/>
+              </a:rPr>
+              <a:t>#Plot it</a:t>
+            </a:r>
+            <a:br/>
+            <a:r>
+              <a:rPr>
+                <a:solidFill>
+                  <a:srgbClr val="06287E"/>
+                </a:solidFill>
+                <a:latin typeface="Courier"/>
+              </a:rPr>
+              <a:t>ggplot</a:t>
+            </a:r>
+            <a:r>
+              <a:rPr>
+                <a:latin typeface="Courier"/>
+              </a:rPr>
+              <a:t>(</a:t>
+            </a:r>
+            <a:r>
+              <a:rPr>
+                <a:solidFill>
+                  <a:srgbClr val="7D9029"/>
+                </a:solidFill>
+                <a:latin typeface="Courier"/>
+              </a:rPr>
+              <a:t>data=</a:t>
+            </a:r>
+            <a:r>
+              <a:rPr>
+                <a:latin typeface="Courier"/>
+              </a:rPr>
+              <a:t>Data,</a:t>
+            </a:r>
+            <a:r>
+              <a:rPr>
+                <a:solidFill>
+                  <a:srgbClr val="7D9029"/>
+                </a:solidFill>
+                <a:latin typeface="Courier"/>
+              </a:rPr>
+              <a:t>mapping=</a:t>
+            </a:r>
+            <a:r>
+              <a:rPr>
+                <a:solidFill>
+                  <a:srgbClr val="06287E"/>
+                </a:solidFill>
+                <a:latin typeface="Courier"/>
+              </a:rPr>
+              <a:t>aes</a:t>
+            </a:r>
+            <a:r>
+              <a:rPr>
+                <a:latin typeface="Courier"/>
+              </a:rPr>
+              <a:t>(</a:t>
+            </a:r>
+            <a:r>
+              <a:rPr>
+                <a:solidFill>
+                  <a:srgbClr val="7D9029"/>
+                </a:solidFill>
+                <a:latin typeface="Courier"/>
+              </a:rPr>
+              <a:t>x=</a:t>
+            </a:r>
+            <a:r>
+              <a:rPr>
+                <a:latin typeface="Courier"/>
+              </a:rPr>
+              <a:t>year, </a:t>
+            </a:r>
+            <a:r>
+              <a:rPr>
+                <a:solidFill>
+                  <a:srgbClr val="7D9029"/>
+                </a:solidFill>
+                <a:latin typeface="Courier"/>
+              </a:rPr>
+              <a:t>y=</a:t>
+            </a:r>
+            <a:r>
+              <a:rPr>
+                <a:latin typeface="Courier"/>
+              </a:rPr>
+              <a:t>mean))</a:t>
+            </a:r>
+            <a:r>
+              <a:rPr>
+                <a:solidFill>
+                  <a:srgbClr val="4070A0"/>
+                </a:solidFill>
+                <a:latin typeface="Courier"/>
+              </a:rPr>
+              <a:t>+</a:t>
+            </a:r>
+            <a:br/>
+            <a:r>
+              <a:rPr>
+                <a:solidFill>
+                  <a:srgbClr val="06287E"/>
+                </a:solidFill>
+                <a:latin typeface="Courier"/>
+              </a:rPr>
+              <a:t>geom_line</a:t>
+            </a:r>
+            <a:r>
+              <a:rPr>
+                <a:latin typeface="Courier"/>
+              </a:rPr>
+              <a:t>(</a:t>
+            </a:r>
+            <a:r>
+              <a:rPr>
+                <a:solidFill>
+                  <a:srgbClr val="7D9029"/>
+                </a:solidFill>
+                <a:latin typeface="Courier"/>
+              </a:rPr>
+              <a:t>color=</a:t>
+            </a:r>
+            <a:r>
+              <a:rPr>
+                <a:solidFill>
+                  <a:srgbClr val="4070A0"/>
+                </a:solidFill>
+                <a:latin typeface="Courier"/>
+              </a:rPr>
+              <a:t>"red"</a:t>
+            </a:r>
+            <a:r>
+              <a:rPr>
+                <a:latin typeface="Courier"/>
+              </a:rPr>
+              <a:t>, </a:t>
+            </a:r>
+            <a:r>
+              <a:rPr>
+                <a:solidFill>
+                  <a:srgbClr val="7D9029"/>
+                </a:solidFill>
+                <a:latin typeface="Courier"/>
+              </a:rPr>
+              <a:t>size=</a:t>
+            </a:r>
+            <a:r>
+              <a:rPr>
+                <a:solidFill>
+                  <a:srgbClr val="40A070"/>
+                </a:solidFill>
+                <a:latin typeface="Courier"/>
+              </a:rPr>
+              <a:t>2</a:t>
+            </a:r>
+            <a:r>
+              <a:rPr>
+                <a:latin typeface="Courier"/>
+              </a:rPr>
+              <a:t>)</a:t>
+            </a:r>
+            <a:r>
+              <a:rPr>
+                <a:solidFill>
+                  <a:srgbClr val="4070A0"/>
+                </a:solidFill>
+                <a:latin typeface="Courier"/>
+              </a:rPr>
+              <a:t>+</a:t>
+            </a:r>
+            <a:br/>
+            <a:r>
+              <a:rPr>
+                <a:solidFill>
+                  <a:srgbClr val="06287E"/>
+                </a:solidFill>
+                <a:latin typeface="Courier"/>
+              </a:rPr>
+              <a:t>xlab</a:t>
+            </a:r>
+            <a:r>
+              <a:rPr>
+                <a:latin typeface="Courier"/>
+              </a:rPr>
+              <a:t>(</a:t>
+            </a:r>
+            <a:r>
+              <a:rPr>
+                <a:solidFill>
+                  <a:srgbClr val="4070A0"/>
+                </a:solidFill>
+                <a:latin typeface="Courier"/>
+              </a:rPr>
+              <a:t>"Year"</a:t>
+            </a:r>
+            <a:r>
+              <a:rPr>
+                <a:latin typeface="Courier"/>
+              </a:rPr>
+              <a:t>)</a:t>
+            </a:r>
+            <a:r>
+              <a:rPr>
+                <a:solidFill>
+                  <a:srgbClr val="4070A0"/>
+                </a:solidFill>
+                <a:latin typeface="Courier"/>
+              </a:rPr>
+              <a:t>+</a:t>
+            </a:r>
+            <a:br/>
+            <a:r>
+              <a:rPr>
+                <a:solidFill>
+                  <a:srgbClr val="06287E"/>
+                </a:solidFill>
+                <a:latin typeface="Courier"/>
+              </a:rPr>
+              <a:t>ylab</a:t>
+            </a:r>
+            <a:r>
+              <a:rPr>
+                <a:latin typeface="Courier"/>
+              </a:rPr>
+              <a:t>(</a:t>
+            </a:r>
+            <a:r>
+              <a:rPr>
+                <a:solidFill>
+                  <a:srgbClr val="4070A0"/>
+                </a:solidFill>
+                <a:latin typeface="Courier"/>
+              </a:rPr>
+              <a:t>"Manual Loa Annual Mean CO_2(ppm)"</a:t>
+            </a:r>
+            <a:r>
+              <a:rPr>
+                <a:latin typeface="Courier"/>
+              </a:rPr>
+              <a:t>)</a:t>
+            </a:r>
+          </a:p>
+        </p:txBody>
+      </p:sp>
+    </p:spTree>
+  </p:cSld>
+</p:sld>
+</file>
+
+<file path=ppt/slides/slide3.xml><?xml version="1.0" encoding="utf-8"?>
+<p:sld xmlns:a="http://schemas.openxmlformats.org/drawingml/2006/main" xmlns:r="http://schemas.openxmlformats.org/officeDocument/2006/relationships" xmlns:p="http://schemas.openxmlformats.org/presentationml/2006/main">
+  <p:cSld>
+    <p:spTree>
+      <p:nvGrpSpPr>
+        <p:cNvPr id="1" name=""/>
+        <p:cNvGrpSpPr/>
+        <p:nvPr/>
+      </p:nvGrpSpPr>
+      <p:grpSpPr>
+        <a:xfrm>
+          <a:off x="0" y="0"/>
+          <a:ext cx="0" cy="0"/>
+          <a:chOff x="0" y="0"/>
+          <a:chExt cx="0" cy="0"/>
+        </a:xfrm>
+      </p:grpSpPr>
+      <p:pic>
+        <p:nvPicPr>
+          <p:cNvPr descr="case_study_08_files/figure-pptx/unnamed-chunk-1-1.png" id="0" name="Picture 1"/>
+          <p:cNvPicPr>
+            <a:picLocks noGrp="1" noChangeAspect="1"/>
+          </p:cNvPicPr>
+          <p:nvPr/>
+        </p:nvPicPr>
+        <p:blipFill>
+          <a:blip r:embed="rId2"/>
+          <a:stretch>
+            <a:fillRect/>
+          </a:stretch>
+        </p:blipFill>
+        <p:spPr bwMode="auto">
+          <a:xfrm>
+            <a:off x="1752600" y="1600200"/>
+            <a:ext cx="5651500" cy="4521200"/>
+          </a:xfrm>
+          <a:prstGeom prst="rect">
+            <a:avLst/>
+          </a:prstGeom>
+          <a:noFill/>
+          <a:ln w="9525">
+            <a:noFill/>
+            <a:headEnd/>
+            <a:tailEnd/>
+          </a:ln>
+        </p:spPr>
+      </p:pic>
+    </p:spTree>
+  </p:cSld>
+</p:sld>
+</file>
+
+<file path=ppt/slides/slide4.xml><?xml version="1.0" encoding="utf-8"?>
+<p:sld xmlns:a="http://schemas.openxmlformats.org/drawingml/2006/main" xmlns:r="http://schemas.openxmlformats.org/officeDocument/2006/relationships" xmlns:p="http://schemas.openxmlformats.org/presentationml/2006/main">
+  <p:cSld>
+    <p:spTree>
+      <p:nvGrpSpPr>
+        <p:cNvPr id="1" name=""/>
+        <p:cNvGrpSpPr/>
+        <p:nvPr/>
+      </p:nvGrpSpPr>
+      <p:grpSpPr>
+        <a:xfrm>
+          <a:off x="0" y="0"/>
+          <a:ext cx="0" cy="0"/>
+          <a:chOff x="0" y="0"/>
+          <a:chExt cx="0" cy="0"/>
+        </a:xfrm>
+      </p:grpSpPr>
+      <p:sp>
+        <p:nvSpPr>
+          <p:cNvPr id="3" name="Content Placeholder 2"/>
+          <p:cNvSpPr>
+            <a:spLocks noGrp="1"/>
+          </p:cNvSpPr>
+          <p:nvPr>
+            <p:ph idx="1"/>
+          </p:nvPr>
+        </p:nvSpPr>
+        <p:spPr/>
+        <p:txBody>
+          <a:bodyPr/>
+          <a:lstStyle/>
+          <a:p>
             <a:pPr lvl="0" marL="0" indent="0">
               <a:buNone/>
             </a:pPr>
+          </a:p>
+          <a:p>
+            <a:pPr lvl="0" indent="0">
+              <a:buNone/>
+            </a:pPr>
+            <a:r>
+              <a:rPr i="1">
+                <a:solidFill>
+                  <a:srgbClr val="60A0B0"/>
+                </a:solidFill>
+                <a:latin typeface="Courier"/>
+              </a:rPr>
+              <a:t>#Top 5 Mean Table</a:t>
+            </a:r>
+            <a:br/>
+            <a:r>
+              <a:rPr>
+                <a:latin typeface="Courier"/>
+              </a:rPr>
+              <a:t>Top5 </a:t>
+            </a:r>
+            <a:r>
+              <a:rPr>
+                <a:solidFill>
+                  <a:srgbClr val="007020"/>
+                </a:solidFill>
+                <a:latin typeface="Courier"/>
+              </a:rPr>
+              <a:t>&lt;-</a:t>
+            </a:r>
+            <a:r>
+              <a:rPr>
+                <a:latin typeface="Courier"/>
+              </a:rPr>
+              <a:t> Data</a:t>
+            </a:r>
+            <a:r>
+              <a:rPr>
+                <a:solidFill>
+                  <a:srgbClr val="4070A0"/>
+                </a:solidFill>
+                <a:latin typeface="Courier"/>
+              </a:rPr>
+              <a:t>%&gt;%</a:t>
+            </a:r>
+            <a:br/>
+            <a:r>
+              <a:rPr>
+                <a:solidFill>
+                  <a:srgbClr val="06287E"/>
+                </a:solidFill>
+                <a:latin typeface="Courier"/>
+              </a:rPr>
+              <a:t>arrange</a:t>
+            </a:r>
+            <a:r>
+              <a:rPr>
+                <a:latin typeface="Courier"/>
+              </a:rPr>
+              <a:t>(</a:t>
+            </a:r>
+            <a:r>
+              <a:rPr>
+                <a:solidFill>
+                  <a:srgbClr val="06287E"/>
+                </a:solidFill>
+                <a:latin typeface="Courier"/>
+              </a:rPr>
+              <a:t>desc</a:t>
+            </a:r>
+            <a:r>
+              <a:rPr>
+                <a:latin typeface="Courier"/>
+              </a:rPr>
+              <a:t>(mean))</a:t>
+            </a:r>
+            <a:r>
+              <a:rPr>
+                <a:solidFill>
+                  <a:srgbClr val="4070A0"/>
+                </a:solidFill>
+                <a:latin typeface="Courier"/>
+              </a:rPr>
+              <a:t>%&gt;%</a:t>
+            </a:r>
+            <a:br/>
+            <a:r>
+              <a:rPr>
+                <a:solidFill>
+                  <a:srgbClr val="06287E"/>
+                </a:solidFill>
+                <a:latin typeface="Courier"/>
+              </a:rPr>
+              <a:t>top_n</a:t>
+            </a:r>
+            <a:r>
+              <a:rPr>
+                <a:latin typeface="Courier"/>
+              </a:rPr>
+              <a:t>(mean, </a:t>
+            </a:r>
+            <a:r>
+              <a:rPr>
+                <a:solidFill>
+                  <a:srgbClr val="7D9029"/>
+                </a:solidFill>
+                <a:latin typeface="Courier"/>
+              </a:rPr>
+              <a:t>n=</a:t>
+            </a:r>
+            <a:r>
+              <a:rPr>
+                <a:solidFill>
+                  <a:srgbClr val="40A070"/>
+                </a:solidFill>
+                <a:latin typeface="Courier"/>
+              </a:rPr>
+              <a:t>5</a:t>
+            </a:r>
+            <a:r>
+              <a:rPr>
+                <a:latin typeface="Courier"/>
+              </a:rPr>
+              <a:t>)</a:t>
+            </a:r>
+            <a:br/>
+            <a:br/>
+            <a:r>
+              <a:rPr i="1">
+                <a:solidFill>
+                  <a:srgbClr val="60A0B0"/>
+                </a:solidFill>
+                <a:latin typeface="Courier"/>
+              </a:rPr>
+              <a:t>#Print Top5</a:t>
+            </a:r>
+            <a:br/>
+            <a:r>
+              <a:rPr>
+                <a:latin typeface="Courier"/>
+              </a:rPr>
+              <a:t>Top5</a:t>
+            </a:r>
+          </a:p>
+          <a:p>
+            <a:pPr lvl="0" indent="0">
+              <a:buNone/>
+            </a:pPr>
+            <a:r>
+              <a:rPr>
+                <a:latin typeface="Courier"/>
+              </a:rPr>
+              <a:t>## # A tibble: 5 x 3
+##    year  mean   unc
+##   &lt;dbl&gt; &lt;dbl&gt; &lt;dbl&gt;
+## 1  2020  414.  0.12
+## 2  2019  412.  0.12
+## 3  2018  409.  0.12
+## 4  2017  407.  0.12
+## 5  2016  404.  0.12</a:t>
+            </a:r>
+          </a:p>
+          <a:p>
+            <a:pPr lvl="0" indent="0">
+              <a:buNone/>
+            </a:pPr>
+            <a:r>
+              <a:rPr i="1">
+                <a:solidFill>
+                  <a:srgbClr val="60A0B0"/>
+                </a:solidFill>
+                <a:latin typeface="Courier"/>
+              </a:rPr>
+              <a:t>#Knit</a:t>
+            </a:r>
+            <a:br/>
+            <a:r>
+              <a:rPr>
+                <a:latin typeface="Courier"/>
+              </a:rPr>
+              <a:t>knitr</a:t>
+            </a:r>
+            <a:r>
+              <a:rPr>
+                <a:solidFill>
+                  <a:srgbClr val="4070A0"/>
+                </a:solidFill>
+                <a:latin typeface="Courier"/>
+              </a:rPr>
+              <a:t>::</a:t>
+            </a:r>
+            <a:r>
+              <a:rPr>
+                <a:solidFill>
+                  <a:srgbClr val="06287E"/>
+                </a:solidFill>
+                <a:latin typeface="Courier"/>
+              </a:rPr>
+              <a:t>kable</a:t>
+            </a:r>
+            <a:r>
+              <a:rPr>
+                <a:latin typeface="Courier"/>
+              </a:rPr>
+              <a:t>(Top5)</a:t>
+            </a:r>
+          </a:p>
+          <a:p>
+            <a:pPr lvl="0" marL="0" indent="0">
+              <a:buNone/>
+            </a:pPr>
             <a:r>
               <a:rPr/>
-              <a:t>```[r] install.packages()</a:t>
+              <a:t>year</a:t>
             </a:r>
           </a:p>
           <a:p>
@@ -3290,7 +4108,7 @@
             </a:pPr>
             <a:r>
               <a:rPr/>
-              <a:t>#Load Packages library(tidyverse) library(dplyr) library(kableExtra)</a:t>
+              <a:t>mean</a:t>
             </a:r>
           </a:p>
           <a:p>
@@ -3299,17 +4117,16 @@
             </a:pPr>
             <a:r>
               <a:rPr/>
-              <a:t>#Read data in URL&lt;- (“</a:t>
-            </a:r>
-            <a:r>
-              <a:rPr>
-                <a:hlinkClick r:id="rId2"/>
-              </a:rPr>
-              <a:t>https://gml.noaa.gov/webdata/ccgg/trends/co2/co2_annmean_mlo.txt</a:t>
-            </a:r>
+              <a:t>unc</a:t>
+            </a:r>
+          </a:p>
+          <a:p>
+            <a:pPr lvl="0" marL="0" indent="0">
+              <a:buNone/>
+            </a:pPr>
             <a:r>
               <a:rPr/>
-              <a:t>”) Data &lt;- read_table(URL, skip=57, col_names= c(“year”, “mean”, “unc”))</a:t>
+              <a:t>2020</a:t>
             </a:r>
           </a:p>
           <a:p>
@@ -3318,7 +4135,7 @@
             </a:pPr>
             <a:r>
               <a:rPr/>
-              <a:t>#Plot it ggplot(data=Data,mapping=aes(x=year, y=mean))+ geom_line(color=“red”, size=2)+ xlab(“Year”)+ ylab(“Manual Loa Annual Mean CO_2(ppm)”)</a:t>
+              <a:t>414.24</a:t>
             </a:r>
           </a:p>
           <a:p>
@@ -3327,7 +4144,7 @@
             </a:pPr>
             <a:r>
               <a:rPr/>
-              <a:t>#Top 5 Mean Table Top5 &lt;- Data%&gt;% arrange(desc(mean))%&gt;% top_n(mean, n=5)</a:t>
+              <a:t>0.12</a:t>
             </a:r>
           </a:p>
           <a:p>
@@ -3336,7 +4153,7 @@
             </a:pPr>
             <a:r>
               <a:rPr/>
-              <a:t>#Print Top5 Top5</a:t>
+              <a:t>2019</a:t>
             </a:r>
           </a:p>
           <a:p>
@@ -3345,7 +4162,97 @@
             </a:pPr>
             <a:r>
               <a:rPr/>
-              <a:t>#Knit knitr::kable(Top5)</a:t>
+              <a:t>411.66</a:t>
+            </a:r>
+          </a:p>
+          <a:p>
+            <a:pPr lvl="0" marL="0" indent="0">
+              <a:buNone/>
+            </a:pPr>
+            <a:r>
+              <a:rPr/>
+              <a:t>0.12</a:t>
+            </a:r>
+          </a:p>
+          <a:p>
+            <a:pPr lvl="0" marL="0" indent="0">
+              <a:buNone/>
+            </a:pPr>
+            <a:r>
+              <a:rPr/>
+              <a:t>2018</a:t>
+            </a:r>
+          </a:p>
+          <a:p>
+            <a:pPr lvl="0" marL="0" indent="0">
+              <a:buNone/>
+            </a:pPr>
+            <a:r>
+              <a:rPr/>
+              <a:t>408.72</a:t>
+            </a:r>
+          </a:p>
+          <a:p>
+            <a:pPr lvl="0" marL="0" indent="0">
+              <a:buNone/>
+            </a:pPr>
+            <a:r>
+              <a:rPr/>
+              <a:t>0.12</a:t>
+            </a:r>
+          </a:p>
+          <a:p>
+            <a:pPr lvl="0" marL="0" indent="0">
+              <a:buNone/>
+            </a:pPr>
+            <a:r>
+              <a:rPr/>
+              <a:t>2017</a:t>
+            </a:r>
+          </a:p>
+          <a:p>
+            <a:pPr lvl="0" marL="0" indent="0">
+              <a:buNone/>
+            </a:pPr>
+            <a:r>
+              <a:rPr/>
+              <a:t>406.76</a:t>
+            </a:r>
+          </a:p>
+          <a:p>
+            <a:pPr lvl="0" marL="0" indent="0">
+              <a:buNone/>
+            </a:pPr>
+            <a:r>
+              <a:rPr/>
+              <a:t>0.12</a:t>
+            </a:r>
+          </a:p>
+          <a:p>
+            <a:pPr lvl="0" marL="0" indent="0">
+              <a:buNone/>
+            </a:pPr>
+            <a:r>
+              <a:rPr/>
+              <a:t>2016</a:t>
+            </a:r>
+          </a:p>
+          <a:p>
+            <a:pPr lvl="0" marL="0" indent="0">
+              <a:buNone/>
+            </a:pPr>
+            <a:r>
+              <a:rPr/>
+              <a:t>404.41</a:t>
+            </a:r>
+          </a:p>
+          <a:p>
+            <a:pPr lvl="0" marL="0" indent="0">
+              <a:buNone/>
+            </a:pPr>
+            <a:r>
+              <a:rPr/>
+              <a:t>0.12</a:t>
             </a:r>
           </a:p>
         </p:txBody>

</xml_diff>